<commit_message>
Aggiornamenti vari + Tutte edge coloring
</commit_message>
<xml_diff>
--- a/ct/ct-docs/ppt/clusters.pptx
+++ b/ct/ct-docs/ppt/clusters.pptx
@@ -7612,36 +7612,6 @@
           </a:p>
         </p:txBody>
       </p:sp>
-      <p:cxnSp>
-        <p:nvCxnSpPr>
-          <p:cNvPr id="130" name="Connettore 1 129"/>
-          <p:cNvCxnSpPr/>
-          <p:nvPr/>
-        </p:nvCxnSpPr>
-        <p:spPr>
-          <a:xfrm>
-            <a:off x="1043608" y="764704"/>
-            <a:ext cx="914400" cy="914400"/>
-          </a:xfrm>
-          <a:prstGeom prst="line">
-            <a:avLst/>
-          </a:prstGeom>
-        </p:spPr>
-        <p:style>
-          <a:lnRef idx="1">
-            <a:schemeClr val="accent1"/>
-          </a:lnRef>
-          <a:fillRef idx="0">
-            <a:schemeClr val="accent1"/>
-          </a:fillRef>
-          <a:effectRef idx="0">
-            <a:schemeClr val="accent1"/>
-          </a:effectRef>
-          <a:fontRef idx="minor">
-            <a:schemeClr val="tx1"/>
-          </a:fontRef>
-        </p:style>
-      </p:cxnSp>
       <p:grpSp>
         <p:nvGrpSpPr>
           <p:cNvPr id="15" name="Gruppo 12"/>

</xml_diff>